<commit_message>
Updated files in example/ folder
</commit_message>
<xml_diff>
--- a/example/project1_arpit.pptx
+++ b/example/project1_arpit.pptx
@@ -5467,8 +5467,8 @@
         </p:blipFill>
         <p:spPr>
           <a:xfrm>
-            <a:off x="115850" y="732025"/>
-            <a:ext cx="6012324" cy="4411476"/>
+            <a:off x="115850" y="808225"/>
+            <a:ext cx="6012324" cy="4335276"/>
           </a:xfrm>
           <a:prstGeom prst="rect">
             <a:avLst/>
@@ -5540,8 +5540,8 @@
         </p:nvSpPr>
         <p:spPr>
           <a:xfrm>
-            <a:off x="6237325" y="2381500"/>
-            <a:ext cx="2629800" cy="787800"/>
+            <a:off x="6237325" y="705100"/>
+            <a:ext cx="2780400" cy="787800"/>
           </a:xfrm>
           <a:prstGeom prst="rect">
             <a:avLst/>
@@ -5572,7 +5572,7 @@
                   <a:schemeClr val="dk1"/>
                 </a:solidFill>
               </a:rPr>
-              <a:t>Figure:</a:t>
+              <a:t>Method</a:t>
             </a:r>
             <a:endParaRPr b="1" sz="1200">
               <a:solidFill>
@@ -5596,7 +5596,136 @@
                   <a:schemeClr val="dk1"/>
                 </a:solidFill>
               </a:rPr>
-              <a:t>Overall workflow of the study</a:t>
+              <a:t>Computational pathology method, CollaTIL, that quantitatively characterizes the immune-collagen relationship within the TME of gynecologic cancers</a:t>
+            </a:r>
+            <a:endParaRPr sz="1200">
+              <a:solidFill>
+                <a:schemeClr val="dk1"/>
+              </a:solidFill>
+            </a:endParaRPr>
+          </a:p>
+          <a:p>
+            <a:pPr indent="0" lvl="0" marL="0" rtl="0" algn="l">
+              <a:spcBef>
+                <a:spcPts val="0"/>
+              </a:spcBef>
+              <a:spcAft>
+                <a:spcPts val="0"/>
+              </a:spcAft>
+              <a:buNone/>
+            </a:pPr>
+            <a:r>
+              <a:t/>
+            </a:r>
+            <a:endParaRPr sz="1200">
+              <a:solidFill>
+                <a:schemeClr val="dk1"/>
+              </a:solidFill>
+            </a:endParaRPr>
+          </a:p>
+          <a:p>
+            <a:pPr indent="0" lvl="0" marL="0" rtl="0" algn="l">
+              <a:spcBef>
+                <a:spcPts val="0"/>
+              </a:spcBef>
+              <a:spcAft>
+                <a:spcPts val="0"/>
+              </a:spcAft>
+              <a:buNone/>
+            </a:pPr>
+            <a:r>
+              <a:rPr b="1" lang="en" sz="1200">
+                <a:solidFill>
+                  <a:schemeClr val="dk1"/>
+                </a:solidFill>
+              </a:rPr>
+              <a:t>Main findings</a:t>
+            </a:r>
+            <a:endParaRPr b="1" sz="1200">
+              <a:solidFill>
+                <a:schemeClr val="dk1"/>
+              </a:solidFill>
+            </a:endParaRPr>
+          </a:p>
+          <a:p>
+            <a:pPr indent="0" lvl="0" marL="0" rtl="0" algn="l">
+              <a:spcBef>
+                <a:spcPts val="0"/>
+              </a:spcBef>
+              <a:spcAft>
+                <a:spcPts val="0"/>
+              </a:spcAft>
+              <a:buNone/>
+            </a:pPr>
+            <a:r>
+              <a:rPr lang="en" sz="1200">
+                <a:solidFill>
+                  <a:schemeClr val="dk1"/>
+                </a:solidFill>
+              </a:rPr>
+              <a:t>-  Increased immune infiltrate is associated with chaotic collagen architecture and higher entropy and vice-versa</a:t>
+            </a:r>
+            <a:endParaRPr sz="1200">
+              <a:solidFill>
+                <a:schemeClr val="dk1"/>
+              </a:solidFill>
+            </a:endParaRPr>
+          </a:p>
+          <a:p>
+            <a:pPr indent="0" lvl="0" marL="0" rtl="0" algn="l">
+              <a:spcBef>
+                <a:spcPts val="0"/>
+              </a:spcBef>
+              <a:spcAft>
+                <a:spcPts val="0"/>
+              </a:spcAft>
+              <a:buNone/>
+            </a:pPr>
+            <a:r>
+              <a:t/>
+            </a:r>
+            <a:endParaRPr sz="1200">
+              <a:solidFill>
+                <a:schemeClr val="dk1"/>
+              </a:solidFill>
+            </a:endParaRPr>
+          </a:p>
+          <a:p>
+            <a:pPr indent="0" lvl="0" marL="0" rtl="0" algn="l">
+              <a:spcBef>
+                <a:spcPts val="0"/>
+              </a:spcBef>
+              <a:spcAft>
+                <a:spcPts val="0"/>
+              </a:spcAft>
+              <a:buNone/>
+            </a:pPr>
+            <a:r>
+              <a:rPr lang="en" sz="1200">
+                <a:solidFill>
+                  <a:schemeClr val="dk1"/>
+                </a:solidFill>
+              </a:rPr>
+              <a:t>- CollaTIL-associated features that stratified disease risk linked to gene signatures corresponding to TCA-cycle in cervical cancer, and amino acid metabolism and macrophages in ovarian cancer</a:t>
+            </a:r>
+            <a:endParaRPr sz="1200">
+              <a:solidFill>
+                <a:schemeClr val="dk1"/>
+              </a:solidFill>
+            </a:endParaRPr>
+          </a:p>
+          <a:p>
+            <a:pPr indent="0" lvl="0" marL="0" rtl="0" algn="l">
+              <a:spcBef>
+                <a:spcPts val="0"/>
+              </a:spcBef>
+              <a:spcAft>
+                <a:spcPts val="0"/>
+              </a:spcAft>
+              <a:buNone/>
+            </a:pPr>
+            <a:r>
+              <a:t/>
             </a:r>
             <a:endParaRPr sz="1200">
               <a:solidFill>
@@ -5614,7 +5743,7 @@
         </p:nvSpPr>
         <p:spPr>
           <a:xfrm>
-            <a:off x="6084925" y="4667500"/>
+            <a:off x="6237325" y="4667500"/>
             <a:ext cx="2932800" cy="787800"/>
           </a:xfrm>
           <a:prstGeom prst="rect">
@@ -5677,6 +5806,53 @@
                 <a:schemeClr val="dk1"/>
               </a:solidFill>
             </a:endParaRPr>
+          </a:p>
+        </p:txBody>
+      </p:sp>
+      <p:sp>
+        <p:nvSpPr>
+          <p:cNvPr id="58" name="Google Shape;58;p13"/>
+          <p:cNvSpPr/>
+          <p:nvPr/>
+        </p:nvSpPr>
+        <p:spPr>
+          <a:xfrm>
+            <a:off x="127425" y="787750"/>
+            <a:ext cx="6012300" cy="4335300"/>
+          </a:xfrm>
+          <a:prstGeom prst="rect">
+            <a:avLst/>
+          </a:prstGeom>
+          <a:noFill/>
+          <a:ln cap="flat" cmpd="sng" w="19050">
+            <a:solidFill>
+              <a:schemeClr val="dk2"/>
+            </a:solidFill>
+            <a:prstDash val="solid"/>
+            <a:round/>
+            <a:headEnd len="sm" w="sm" type="none"/>
+            <a:tailEnd len="sm" w="sm" type="none"/>
+          </a:ln>
+        </p:spPr>
+        <p:txBody>
+          <a:bodyPr anchorCtr="0" anchor="ctr" bIns="91425" lIns="91425" spcFirstLastPara="1" rIns="91425" wrap="square" tIns="91425">
+            <a:noAutofit/>
+          </a:bodyPr>
+          <a:lstStyle/>
+          <a:p>
+            <a:pPr indent="0" lvl="0" marL="0" rtl="0" algn="ctr">
+              <a:spcBef>
+                <a:spcPts val="0"/>
+              </a:spcBef>
+              <a:spcAft>
+                <a:spcPts val="0"/>
+              </a:spcAft>
+              <a:buNone/>
+            </a:pPr>
+            <a:r>
+              <a:t/>
+            </a:r>
+            <a:endParaRPr/>
           </a:p>
         </p:txBody>
       </p:sp>

</xml_diff>